<commit_message>
Fundamentals: Changes to session 9
</commit_message>
<xml_diff>
--- a/fundamentals/9-Type conversion, Files, doctest.pptx
+++ b/fundamentals/9-Type conversion, Files, doctest.pptx
@@ -17,10 +17,13 @@
     <p:sldId id="260" r:id="rId11"/>
     <p:sldId id="261" r:id="rId12"/>
     <p:sldId id="263" r:id="rId13"/>
-    <p:sldId id="266" r:id="rId14"/>
-    <p:sldId id="267" r:id="rId15"/>
-    <p:sldId id="268" r:id="rId16"/>
-    <p:sldId id="264" r:id="rId17"/>
+    <p:sldId id="296" r:id="rId14"/>
+    <p:sldId id="297" r:id="rId15"/>
+    <p:sldId id="298" r:id="rId16"/>
+    <p:sldId id="266" r:id="rId17"/>
+    <p:sldId id="267" r:id="rId18"/>
+    <p:sldId id="268" r:id="rId19"/>
+    <p:sldId id="264" r:id="rId20"/>
   </p:sldIdLst>
   <p:sldSz cx="12192000" cy="6858000"/>
   <p:notesSz cx="6858000" cy="9144000"/>
@@ -276,7 +279,7 @@
           <a:p>
             <a:fld id="{B302FF2A-D2B5-8B4F-BDBF-6F9493847AEA}" type="datetimeFigureOut">
               <a:rPr lang="en-US" smtClean="0"/>
-              <a:t>8/31/20</a:t>
+              <a:t>9/9/20</a:t>
             </a:fld>
             <a:endParaRPr lang="en-US"/>
           </a:p>
@@ -476,7 +479,7 @@
           <a:p>
             <a:fld id="{B302FF2A-D2B5-8B4F-BDBF-6F9493847AEA}" type="datetimeFigureOut">
               <a:rPr lang="en-US" smtClean="0"/>
-              <a:t>8/31/20</a:t>
+              <a:t>9/9/20</a:t>
             </a:fld>
             <a:endParaRPr lang="en-US"/>
           </a:p>
@@ -686,7 +689,7 @@
           <a:p>
             <a:fld id="{B302FF2A-D2B5-8B4F-BDBF-6F9493847AEA}" type="datetimeFigureOut">
               <a:rPr lang="en-US" smtClean="0"/>
-              <a:t>8/31/20</a:t>
+              <a:t>9/9/20</a:t>
             </a:fld>
             <a:endParaRPr lang="en-US"/>
           </a:p>
@@ -886,7 +889,7 @@
           <a:p>
             <a:fld id="{B302FF2A-D2B5-8B4F-BDBF-6F9493847AEA}" type="datetimeFigureOut">
               <a:rPr lang="en-US" smtClean="0"/>
-              <a:t>8/31/20</a:t>
+              <a:t>9/9/20</a:t>
             </a:fld>
             <a:endParaRPr lang="en-US"/>
           </a:p>
@@ -1162,7 +1165,7 @@
           <a:p>
             <a:fld id="{B302FF2A-D2B5-8B4F-BDBF-6F9493847AEA}" type="datetimeFigureOut">
               <a:rPr lang="en-US" smtClean="0"/>
-              <a:t>8/31/20</a:t>
+              <a:t>9/9/20</a:t>
             </a:fld>
             <a:endParaRPr lang="en-US"/>
           </a:p>
@@ -1430,7 +1433,7 @@
           <a:p>
             <a:fld id="{B302FF2A-D2B5-8B4F-BDBF-6F9493847AEA}" type="datetimeFigureOut">
               <a:rPr lang="en-US" smtClean="0"/>
-              <a:t>8/31/20</a:t>
+              <a:t>9/9/20</a:t>
             </a:fld>
             <a:endParaRPr lang="en-US"/>
           </a:p>
@@ -1845,7 +1848,7 @@
           <a:p>
             <a:fld id="{B302FF2A-D2B5-8B4F-BDBF-6F9493847AEA}" type="datetimeFigureOut">
               <a:rPr lang="en-US" smtClean="0"/>
-              <a:t>8/31/20</a:t>
+              <a:t>9/9/20</a:t>
             </a:fld>
             <a:endParaRPr lang="en-US"/>
           </a:p>
@@ -1987,7 +1990,7 @@
           <a:p>
             <a:fld id="{B302FF2A-D2B5-8B4F-BDBF-6F9493847AEA}" type="datetimeFigureOut">
               <a:rPr lang="en-US" smtClean="0"/>
-              <a:t>8/31/20</a:t>
+              <a:t>9/9/20</a:t>
             </a:fld>
             <a:endParaRPr lang="en-US"/>
           </a:p>
@@ -2100,7 +2103,7 @@
           <a:p>
             <a:fld id="{B302FF2A-D2B5-8B4F-BDBF-6F9493847AEA}" type="datetimeFigureOut">
               <a:rPr lang="en-US" smtClean="0"/>
-              <a:t>8/31/20</a:t>
+              <a:t>9/9/20</a:t>
             </a:fld>
             <a:endParaRPr lang="en-US"/>
           </a:p>
@@ -2413,7 +2416,7 @@
           <a:p>
             <a:fld id="{B302FF2A-D2B5-8B4F-BDBF-6F9493847AEA}" type="datetimeFigureOut">
               <a:rPr lang="en-US" smtClean="0"/>
-              <a:t>8/31/20</a:t>
+              <a:t>9/9/20</a:t>
             </a:fld>
             <a:endParaRPr lang="en-US"/>
           </a:p>
@@ -2702,7 +2705,7 @@
           <a:p>
             <a:fld id="{B302FF2A-D2B5-8B4F-BDBF-6F9493847AEA}" type="datetimeFigureOut">
               <a:rPr lang="en-US" smtClean="0"/>
-              <a:t>8/31/20</a:t>
+              <a:t>9/9/20</a:t>
             </a:fld>
             <a:endParaRPr lang="en-US"/>
           </a:p>
@@ -2945,7 +2948,7 @@
           <a:p>
             <a:fld id="{B302FF2A-D2B5-8B4F-BDBF-6F9493847AEA}" type="datetimeFigureOut">
               <a:rPr lang="en-US" smtClean="0"/>
-              <a:t>8/31/20</a:t>
+              <a:t>9/9/20</a:t>
             </a:fld>
             <a:endParaRPr lang="en-US"/>
           </a:p>
@@ -4813,6 +4816,1538 @@
 </file>
 
 <file path=ppt/slides/slide13.xml><?xml version="1.0" encoding="utf-8"?>
+<p:sld xmlns:a="http://schemas.openxmlformats.org/drawingml/2006/main" xmlns:r="http://schemas.openxmlformats.org/officeDocument/2006/relationships" xmlns:p="http://schemas.openxmlformats.org/presentationml/2006/main">
+  <p:cSld>
+    <p:spTree>
+      <p:nvGrpSpPr>
+        <p:cNvPr id="1" name=""/>
+        <p:cNvGrpSpPr/>
+        <p:nvPr/>
+      </p:nvGrpSpPr>
+      <p:grpSpPr>
+        <a:xfrm>
+          <a:off x="0" y="0"/>
+          <a:ext cx="0" cy="0"/>
+          <a:chOff x="0" y="0"/>
+          <a:chExt cx="0" cy="0"/>
+        </a:xfrm>
+      </p:grpSpPr>
+      <p:sp>
+        <p:nvSpPr>
+          <p:cNvPr id="2" name="Title 1">
+            <a:extLst>
+              <a:ext uri="{FF2B5EF4-FFF2-40B4-BE49-F238E27FC236}">
+                <a16:creationId xmlns:a16="http://schemas.microsoft.com/office/drawing/2014/main" id="{32ACAF41-63B1-7041-BB7C-51C6BC594005}"/>
+              </a:ext>
+            </a:extLst>
+          </p:cNvPr>
+          <p:cNvSpPr>
+            <a:spLocks noGrp="1"/>
+          </p:cNvSpPr>
+          <p:nvPr>
+            <p:ph type="title"/>
+          </p:nvPr>
+        </p:nvSpPr>
+        <p:spPr/>
+        <p:txBody>
+          <a:bodyPr/>
+          <a:lstStyle/>
+          <a:p>
+            <a:r>
+              <a:rPr lang="en-US" dirty="0"/>
+              <a:t>Error handling</a:t>
+            </a:r>
+          </a:p>
+        </p:txBody>
+      </p:sp>
+      <p:sp>
+        <p:nvSpPr>
+          <p:cNvPr id="3" name="Content Placeholder 2">
+            <a:extLst>
+              <a:ext uri="{FF2B5EF4-FFF2-40B4-BE49-F238E27FC236}">
+                <a16:creationId xmlns:a16="http://schemas.microsoft.com/office/drawing/2014/main" id="{B9D94924-1F84-CD42-851E-D55781B09A79}"/>
+              </a:ext>
+            </a:extLst>
+          </p:cNvPr>
+          <p:cNvSpPr>
+            <a:spLocks noGrp="1"/>
+          </p:cNvSpPr>
+          <p:nvPr>
+            <p:ph idx="1"/>
+          </p:nvPr>
+        </p:nvSpPr>
+        <p:spPr/>
+        <p:txBody>
+          <a:bodyPr/>
+          <a:lstStyle/>
+          <a:p>
+            <a:r>
+              <a:rPr lang="en-US" dirty="0"/>
+              <a:t>How many </a:t>
+            </a:r>
+            <a:r>
+              <a:rPr lang="en-US" i="1" dirty="0"/>
+              <a:t>kinds</a:t>
+            </a:r>
+            <a:r>
+              <a:rPr lang="en-US" dirty="0"/>
+              <a:t> of errors can you hit ?</a:t>
+            </a:r>
+          </a:p>
+          <a:p>
+            <a:endParaRPr lang="en-US" dirty="0"/>
+          </a:p>
+          <a:p>
+            <a:r>
+              <a:rPr lang="en-US" dirty="0"/>
+              <a:t>Syntax error</a:t>
+            </a:r>
+          </a:p>
+          <a:p>
+            <a:endParaRPr lang="en-US" dirty="0"/>
+          </a:p>
+          <a:p>
+            <a:r>
+              <a:rPr lang="en-US" dirty="0"/>
+              <a:t>Run-time error</a:t>
+            </a:r>
+          </a:p>
+          <a:p>
+            <a:pPr lvl="1"/>
+            <a:r>
+              <a:rPr lang="en-US" dirty="0"/>
+              <a:t>Called </a:t>
+            </a:r>
+            <a:r>
+              <a:rPr lang="en-US" i="1" dirty="0"/>
+              <a:t>Exception</a:t>
+            </a:r>
+            <a:endParaRPr lang="en-US" dirty="0"/>
+          </a:p>
+        </p:txBody>
+      </p:sp>
+    </p:spTree>
+    <p:extLst>
+      <p:ext uri="{BB962C8B-B14F-4D97-AF65-F5344CB8AC3E}">
+        <p14:creationId xmlns:p14="http://schemas.microsoft.com/office/powerpoint/2010/main" val="4288745605"/>
+      </p:ext>
+    </p:extLst>
+  </p:cSld>
+  <p:clrMapOvr>
+    <a:masterClrMapping/>
+  </p:clrMapOvr>
+  <p:timing>
+    <p:tnLst>
+      <p:par>
+        <p:cTn id="1" dur="indefinite" restart="never" nodeType="tmRoot">
+          <p:childTnLst>
+            <p:seq concurrent="1" nextAc="seek">
+              <p:cTn id="2" dur="indefinite" nodeType="mainSeq">
+                <p:childTnLst>
+                  <p:par>
+                    <p:cTn id="3" fill="hold">
+                      <p:stCondLst>
+                        <p:cond delay="indefinite"/>
+                      </p:stCondLst>
+                      <p:childTnLst>
+                        <p:par>
+                          <p:cTn id="4" fill="hold">
+                            <p:stCondLst>
+                              <p:cond delay="0"/>
+                            </p:stCondLst>
+                            <p:childTnLst>
+                              <p:par>
+                                <p:cTn id="5" presetID="1" presetClass="entr" presetSubtype="0" fill="hold" grpId="0" nodeType="clickEffect">
+                                  <p:stCondLst>
+                                    <p:cond delay="0"/>
+                                  </p:stCondLst>
+                                  <p:childTnLst>
+                                    <p:set>
+                                      <p:cBhvr>
+                                        <p:cTn id="6" dur="1" fill="hold">
+                                          <p:stCondLst>
+                                            <p:cond delay="0"/>
+                                          </p:stCondLst>
+                                        </p:cTn>
+                                        <p:tgtEl>
+                                          <p:spTgt spid="3">
+                                            <p:txEl>
+                                              <p:pRg st="0" end="0"/>
+                                            </p:txEl>
+                                          </p:spTgt>
+                                        </p:tgtEl>
+                                        <p:attrNameLst>
+                                          <p:attrName>style.visibility</p:attrName>
+                                        </p:attrNameLst>
+                                      </p:cBhvr>
+                                      <p:to>
+                                        <p:strVal val="visible"/>
+                                      </p:to>
+                                    </p:set>
+                                  </p:childTnLst>
+                                </p:cTn>
+                              </p:par>
+                            </p:childTnLst>
+                          </p:cTn>
+                        </p:par>
+                      </p:childTnLst>
+                    </p:cTn>
+                  </p:par>
+                  <p:par>
+                    <p:cTn id="7" fill="hold">
+                      <p:stCondLst>
+                        <p:cond delay="indefinite"/>
+                      </p:stCondLst>
+                      <p:childTnLst>
+                        <p:par>
+                          <p:cTn id="8" fill="hold">
+                            <p:stCondLst>
+                              <p:cond delay="0"/>
+                            </p:stCondLst>
+                            <p:childTnLst>
+                              <p:par>
+                                <p:cTn id="9" presetID="1" presetClass="entr" presetSubtype="0" fill="hold" grpId="0" nodeType="clickEffect">
+                                  <p:stCondLst>
+                                    <p:cond delay="0"/>
+                                  </p:stCondLst>
+                                  <p:childTnLst>
+                                    <p:set>
+                                      <p:cBhvr>
+                                        <p:cTn id="10" dur="1" fill="hold">
+                                          <p:stCondLst>
+                                            <p:cond delay="0"/>
+                                          </p:stCondLst>
+                                        </p:cTn>
+                                        <p:tgtEl>
+                                          <p:spTgt spid="3">
+                                            <p:txEl>
+                                              <p:pRg st="2" end="2"/>
+                                            </p:txEl>
+                                          </p:spTgt>
+                                        </p:tgtEl>
+                                        <p:attrNameLst>
+                                          <p:attrName>style.visibility</p:attrName>
+                                        </p:attrNameLst>
+                                      </p:cBhvr>
+                                      <p:to>
+                                        <p:strVal val="visible"/>
+                                      </p:to>
+                                    </p:set>
+                                  </p:childTnLst>
+                                </p:cTn>
+                              </p:par>
+                            </p:childTnLst>
+                          </p:cTn>
+                        </p:par>
+                      </p:childTnLst>
+                    </p:cTn>
+                  </p:par>
+                  <p:par>
+                    <p:cTn id="11" fill="hold">
+                      <p:stCondLst>
+                        <p:cond delay="indefinite"/>
+                      </p:stCondLst>
+                      <p:childTnLst>
+                        <p:par>
+                          <p:cTn id="12" fill="hold">
+                            <p:stCondLst>
+                              <p:cond delay="0"/>
+                            </p:stCondLst>
+                            <p:childTnLst>
+                              <p:par>
+                                <p:cTn id="13" presetID="1" presetClass="entr" presetSubtype="0" fill="hold" grpId="0" nodeType="clickEffect">
+                                  <p:stCondLst>
+                                    <p:cond delay="0"/>
+                                  </p:stCondLst>
+                                  <p:childTnLst>
+                                    <p:set>
+                                      <p:cBhvr>
+                                        <p:cTn id="14" dur="1" fill="hold">
+                                          <p:stCondLst>
+                                            <p:cond delay="0"/>
+                                          </p:stCondLst>
+                                        </p:cTn>
+                                        <p:tgtEl>
+                                          <p:spTgt spid="3">
+                                            <p:txEl>
+                                              <p:pRg st="4" end="4"/>
+                                            </p:txEl>
+                                          </p:spTgt>
+                                        </p:tgtEl>
+                                        <p:attrNameLst>
+                                          <p:attrName>style.visibility</p:attrName>
+                                        </p:attrNameLst>
+                                      </p:cBhvr>
+                                      <p:to>
+                                        <p:strVal val="visible"/>
+                                      </p:to>
+                                    </p:set>
+                                  </p:childTnLst>
+                                </p:cTn>
+                              </p:par>
+                              <p:par>
+                                <p:cTn id="15" presetID="1" presetClass="entr" presetSubtype="0" fill="hold" grpId="0" nodeType="withEffect">
+                                  <p:stCondLst>
+                                    <p:cond delay="0"/>
+                                  </p:stCondLst>
+                                  <p:childTnLst>
+                                    <p:set>
+                                      <p:cBhvr>
+                                        <p:cTn id="16" dur="1" fill="hold">
+                                          <p:stCondLst>
+                                            <p:cond delay="0"/>
+                                          </p:stCondLst>
+                                        </p:cTn>
+                                        <p:tgtEl>
+                                          <p:spTgt spid="3">
+                                            <p:txEl>
+                                              <p:pRg st="5" end="5"/>
+                                            </p:txEl>
+                                          </p:spTgt>
+                                        </p:tgtEl>
+                                        <p:attrNameLst>
+                                          <p:attrName>style.visibility</p:attrName>
+                                        </p:attrNameLst>
+                                      </p:cBhvr>
+                                      <p:to>
+                                        <p:strVal val="visible"/>
+                                      </p:to>
+                                    </p:set>
+                                  </p:childTnLst>
+                                </p:cTn>
+                              </p:par>
+                            </p:childTnLst>
+                          </p:cTn>
+                        </p:par>
+                      </p:childTnLst>
+                    </p:cTn>
+                  </p:par>
+                  <p:par>
+                    <p:cTn id="17" fill="hold">
+                      <p:stCondLst>
+                        <p:cond delay="indefinite"/>
+                      </p:stCondLst>
+                      <p:childTnLst>
+                        <p:par>
+                          <p:cTn id="18" fill="hold">
+                            <p:stCondLst>
+                              <p:cond delay="0"/>
+                            </p:stCondLst>
+                            <p:childTnLst>
+                              <p:par>
+                                <p:cTn id="19" presetID="1" presetClass="entr" presetSubtype="0" fill="hold" nodeType="clickEffect">
+                                  <p:stCondLst>
+                                    <p:cond delay="0"/>
+                                  </p:stCondLst>
+                                  <p:childTnLst>
+                                    <p:set>
+                                      <p:cBhvr>
+                                        <p:cTn id="20" dur="1" fill="hold">
+                                          <p:stCondLst>
+                                            <p:cond delay="0"/>
+                                          </p:stCondLst>
+                                        </p:cTn>
+                                        <p:tgtEl>
+                                          <p:spTgt spid="3">
+                                            <p:txEl>
+                                              <p:pRg st="5" end="5"/>
+                                            </p:txEl>
+                                          </p:spTgt>
+                                        </p:tgtEl>
+                                        <p:attrNameLst>
+                                          <p:attrName>style.visibility</p:attrName>
+                                        </p:attrNameLst>
+                                      </p:cBhvr>
+                                      <p:to>
+                                        <p:strVal val="visible"/>
+                                      </p:to>
+                                    </p:set>
+                                  </p:childTnLst>
+                                </p:cTn>
+                              </p:par>
+                            </p:childTnLst>
+                          </p:cTn>
+                        </p:par>
+                      </p:childTnLst>
+                    </p:cTn>
+                  </p:par>
+                </p:childTnLst>
+              </p:cTn>
+              <p:prevCondLst>
+                <p:cond evt="onPrev" delay="0">
+                  <p:tgtEl>
+                    <p:sldTgt/>
+                  </p:tgtEl>
+                </p:cond>
+              </p:prevCondLst>
+              <p:nextCondLst>
+                <p:cond evt="onNext" delay="0">
+                  <p:tgtEl>
+                    <p:sldTgt/>
+                  </p:tgtEl>
+                </p:cond>
+              </p:nextCondLst>
+            </p:seq>
+          </p:childTnLst>
+        </p:cTn>
+      </p:par>
+    </p:tnLst>
+    <p:bldLst>
+      <p:bldP spid="3" grpId="0" build="p"/>
+    </p:bldLst>
+  </p:timing>
+</p:sld>
+</file>
+
+<file path=ppt/slides/slide14.xml><?xml version="1.0" encoding="utf-8"?>
+<p:sld xmlns:a="http://schemas.openxmlformats.org/drawingml/2006/main" xmlns:r="http://schemas.openxmlformats.org/officeDocument/2006/relationships" xmlns:p="http://schemas.openxmlformats.org/presentationml/2006/main">
+  <p:cSld>
+    <p:spTree>
+      <p:nvGrpSpPr>
+        <p:cNvPr id="1" name=""/>
+        <p:cNvGrpSpPr/>
+        <p:nvPr/>
+      </p:nvGrpSpPr>
+      <p:grpSpPr>
+        <a:xfrm>
+          <a:off x="0" y="0"/>
+          <a:ext cx="0" cy="0"/>
+          <a:chOff x="0" y="0"/>
+          <a:chExt cx="0" cy="0"/>
+        </a:xfrm>
+      </p:grpSpPr>
+      <p:sp>
+        <p:nvSpPr>
+          <p:cNvPr id="2" name="Title 1">
+            <a:extLst>
+              <a:ext uri="{FF2B5EF4-FFF2-40B4-BE49-F238E27FC236}">
+                <a16:creationId xmlns:a16="http://schemas.microsoft.com/office/drawing/2014/main" id="{3174B68C-0328-1A49-B795-E3B2AD196C38}"/>
+              </a:ext>
+            </a:extLst>
+          </p:cNvPr>
+          <p:cNvSpPr>
+            <a:spLocks noGrp="1"/>
+          </p:cNvSpPr>
+          <p:nvPr>
+            <p:ph type="title"/>
+          </p:nvPr>
+        </p:nvSpPr>
+        <p:spPr/>
+        <p:txBody>
+          <a:bodyPr/>
+          <a:lstStyle/>
+          <a:p>
+            <a:r>
+              <a:rPr lang="en-US" dirty="0"/>
+              <a:t>Exceptions</a:t>
+            </a:r>
+          </a:p>
+        </p:txBody>
+      </p:sp>
+      <p:sp>
+        <p:nvSpPr>
+          <p:cNvPr id="3" name="Content Placeholder 2">
+            <a:extLst>
+              <a:ext uri="{FF2B5EF4-FFF2-40B4-BE49-F238E27FC236}">
+                <a16:creationId xmlns:a16="http://schemas.microsoft.com/office/drawing/2014/main" id="{1BB207B3-AC34-0745-BE59-115EFBED6536}"/>
+              </a:ext>
+            </a:extLst>
+          </p:cNvPr>
+          <p:cNvSpPr>
+            <a:spLocks noGrp="1"/>
+          </p:cNvSpPr>
+          <p:nvPr>
+            <p:ph idx="1"/>
+          </p:nvPr>
+        </p:nvSpPr>
+        <p:spPr/>
+        <p:txBody>
+          <a:bodyPr>
+            <a:normAutofit fontScale="92500" lnSpcReduction="20000"/>
+          </a:bodyPr>
+          <a:lstStyle/>
+          <a:p>
+            <a:pPr marL="0" indent="0">
+              <a:buNone/>
+            </a:pPr>
+            <a:r>
+              <a:rPr lang="en-GB" dirty="0"/>
+              <a:t>&gt;&gt;&gt; 1 / 0 </a:t>
+            </a:r>
+          </a:p>
+          <a:p>
+            <a:pPr marL="0" indent="0">
+              <a:buNone/>
+            </a:pPr>
+            <a:r>
+              <a:rPr lang="en-GB" dirty="0"/>
+              <a:t>Traceback (most recent call last): File "&lt;stdin&gt;", line 1, in &lt;module&gt; </a:t>
+            </a:r>
+            <a:r>
+              <a:rPr lang="en-GB" dirty="0" err="1"/>
+              <a:t>ZeroDivisionError</a:t>
+            </a:r>
+            <a:r>
+              <a:rPr lang="en-GB" dirty="0"/>
+              <a:t>: division by zero </a:t>
+            </a:r>
+          </a:p>
+          <a:p>
+            <a:pPr marL="0" indent="0">
+              <a:buNone/>
+            </a:pPr>
+            <a:endParaRPr lang="en-GB" dirty="0"/>
+          </a:p>
+          <a:p>
+            <a:pPr marL="0" indent="0">
+              <a:buNone/>
+            </a:pPr>
+            <a:r>
+              <a:rPr lang="en-GB" dirty="0"/>
+              <a:t>&gt;&gt;&gt; 4 + spam*3 </a:t>
+            </a:r>
+          </a:p>
+          <a:p>
+            <a:pPr marL="0" indent="0">
+              <a:buNone/>
+            </a:pPr>
+            <a:r>
+              <a:rPr lang="en-GB" dirty="0"/>
+              <a:t>Traceback (most recent call last): File "&lt;stdin&gt;", line 1, in &lt;module&gt; </a:t>
+            </a:r>
+            <a:r>
+              <a:rPr lang="en-GB" dirty="0" err="1"/>
+              <a:t>NameError</a:t>
+            </a:r>
+            <a:r>
+              <a:rPr lang="en-GB" dirty="0"/>
+              <a:t>: name 'spam' is not defined </a:t>
+            </a:r>
+          </a:p>
+          <a:p>
+            <a:pPr marL="0" indent="0">
+              <a:buNone/>
+            </a:pPr>
+            <a:endParaRPr lang="en-GB" dirty="0"/>
+          </a:p>
+          <a:p>
+            <a:pPr marL="0" indent="0">
+              <a:buNone/>
+            </a:pPr>
+            <a:r>
+              <a:rPr lang="en-GB" dirty="0"/>
+              <a:t>&gt;&gt;&gt; '2' + 2 </a:t>
+            </a:r>
+          </a:p>
+          <a:p>
+            <a:pPr marL="0" indent="0">
+              <a:buNone/>
+            </a:pPr>
+            <a:r>
+              <a:rPr lang="en-GB" dirty="0"/>
+              <a:t>Traceback (most recent call last): File "&lt;stdin&gt;", line 1, in &lt;module&gt; </a:t>
+            </a:r>
+            <a:r>
+              <a:rPr lang="en-GB" dirty="0" err="1"/>
+              <a:t>TypeError</a:t>
+            </a:r>
+            <a:r>
+              <a:rPr lang="en-GB" dirty="0"/>
+              <a:t>: Can't convert 'int' object to str implicitly</a:t>
+            </a:r>
+            <a:endParaRPr lang="en-US" dirty="0"/>
+          </a:p>
+        </p:txBody>
+      </p:sp>
+    </p:spTree>
+    <p:extLst>
+      <p:ext uri="{BB962C8B-B14F-4D97-AF65-F5344CB8AC3E}">
+        <p14:creationId xmlns:p14="http://schemas.microsoft.com/office/powerpoint/2010/main" val="3291435860"/>
+      </p:ext>
+    </p:extLst>
+  </p:cSld>
+  <p:clrMapOvr>
+    <a:masterClrMapping/>
+  </p:clrMapOvr>
+  <p:timing>
+    <p:tnLst>
+      <p:par>
+        <p:cTn id="1" dur="indefinite" restart="never" nodeType="tmRoot">
+          <p:childTnLst>
+            <p:seq concurrent="1" nextAc="seek">
+              <p:cTn id="2" dur="indefinite" nodeType="mainSeq">
+                <p:childTnLst>
+                  <p:par>
+                    <p:cTn id="3" fill="hold">
+                      <p:stCondLst>
+                        <p:cond delay="indefinite"/>
+                      </p:stCondLst>
+                      <p:childTnLst>
+                        <p:par>
+                          <p:cTn id="4" fill="hold">
+                            <p:stCondLst>
+                              <p:cond delay="0"/>
+                            </p:stCondLst>
+                            <p:childTnLst>
+                              <p:par>
+                                <p:cTn id="5" presetID="1" presetClass="entr" presetSubtype="0" fill="hold" nodeType="clickEffect">
+                                  <p:stCondLst>
+                                    <p:cond delay="0"/>
+                                  </p:stCondLst>
+                                  <p:childTnLst>
+                                    <p:set>
+                                      <p:cBhvr>
+                                        <p:cTn id="6" dur="1" fill="hold">
+                                          <p:stCondLst>
+                                            <p:cond delay="0"/>
+                                          </p:stCondLst>
+                                        </p:cTn>
+                                        <p:tgtEl>
+                                          <p:spTgt spid="3">
+                                            <p:txEl>
+                                              <p:pRg st="0" end="0"/>
+                                            </p:txEl>
+                                          </p:spTgt>
+                                        </p:tgtEl>
+                                        <p:attrNameLst>
+                                          <p:attrName>style.visibility</p:attrName>
+                                        </p:attrNameLst>
+                                      </p:cBhvr>
+                                      <p:to>
+                                        <p:strVal val="visible"/>
+                                      </p:to>
+                                    </p:set>
+                                  </p:childTnLst>
+                                </p:cTn>
+                              </p:par>
+                              <p:par>
+                                <p:cTn id="7" presetID="1" presetClass="entr" presetSubtype="0" fill="hold" nodeType="withEffect">
+                                  <p:stCondLst>
+                                    <p:cond delay="0"/>
+                                  </p:stCondLst>
+                                  <p:childTnLst>
+                                    <p:set>
+                                      <p:cBhvr>
+                                        <p:cTn id="8" dur="1" fill="hold">
+                                          <p:stCondLst>
+                                            <p:cond delay="0"/>
+                                          </p:stCondLst>
+                                        </p:cTn>
+                                        <p:tgtEl>
+                                          <p:spTgt spid="3">
+                                            <p:txEl>
+                                              <p:pRg st="1" end="1"/>
+                                            </p:txEl>
+                                          </p:spTgt>
+                                        </p:tgtEl>
+                                        <p:attrNameLst>
+                                          <p:attrName>style.visibility</p:attrName>
+                                        </p:attrNameLst>
+                                      </p:cBhvr>
+                                      <p:to>
+                                        <p:strVal val="visible"/>
+                                      </p:to>
+                                    </p:set>
+                                  </p:childTnLst>
+                                </p:cTn>
+                              </p:par>
+                              <p:par>
+                                <p:cTn id="9" presetID="1" presetClass="entr" presetSubtype="0" fill="hold" nodeType="withEffect">
+                                  <p:stCondLst>
+                                    <p:cond delay="0"/>
+                                  </p:stCondLst>
+                                  <p:childTnLst>
+                                    <p:set>
+                                      <p:cBhvr>
+                                        <p:cTn id="10" dur="1" fill="hold">
+                                          <p:stCondLst>
+                                            <p:cond delay="0"/>
+                                          </p:stCondLst>
+                                        </p:cTn>
+                                        <p:tgtEl>
+                                          <p:spTgt spid="3">
+                                            <p:txEl>
+                                              <p:pRg st="3" end="3"/>
+                                            </p:txEl>
+                                          </p:spTgt>
+                                        </p:tgtEl>
+                                        <p:attrNameLst>
+                                          <p:attrName>style.visibility</p:attrName>
+                                        </p:attrNameLst>
+                                      </p:cBhvr>
+                                      <p:to>
+                                        <p:strVal val="visible"/>
+                                      </p:to>
+                                    </p:set>
+                                  </p:childTnLst>
+                                </p:cTn>
+                              </p:par>
+                              <p:par>
+                                <p:cTn id="11" presetID="1" presetClass="entr" presetSubtype="0" fill="hold" nodeType="withEffect">
+                                  <p:stCondLst>
+                                    <p:cond delay="0"/>
+                                  </p:stCondLst>
+                                  <p:childTnLst>
+                                    <p:set>
+                                      <p:cBhvr>
+                                        <p:cTn id="12" dur="1" fill="hold">
+                                          <p:stCondLst>
+                                            <p:cond delay="0"/>
+                                          </p:stCondLst>
+                                        </p:cTn>
+                                        <p:tgtEl>
+                                          <p:spTgt spid="3">
+                                            <p:txEl>
+                                              <p:pRg st="4" end="4"/>
+                                            </p:txEl>
+                                          </p:spTgt>
+                                        </p:tgtEl>
+                                        <p:attrNameLst>
+                                          <p:attrName>style.visibility</p:attrName>
+                                        </p:attrNameLst>
+                                      </p:cBhvr>
+                                      <p:to>
+                                        <p:strVal val="visible"/>
+                                      </p:to>
+                                    </p:set>
+                                  </p:childTnLst>
+                                </p:cTn>
+                              </p:par>
+                              <p:par>
+                                <p:cTn id="13" presetID="1" presetClass="entr" presetSubtype="0" fill="hold" nodeType="withEffect">
+                                  <p:stCondLst>
+                                    <p:cond delay="0"/>
+                                  </p:stCondLst>
+                                  <p:childTnLst>
+                                    <p:set>
+                                      <p:cBhvr>
+                                        <p:cTn id="14" dur="1" fill="hold">
+                                          <p:stCondLst>
+                                            <p:cond delay="0"/>
+                                          </p:stCondLst>
+                                        </p:cTn>
+                                        <p:tgtEl>
+                                          <p:spTgt spid="3">
+                                            <p:txEl>
+                                              <p:pRg st="6" end="6"/>
+                                            </p:txEl>
+                                          </p:spTgt>
+                                        </p:tgtEl>
+                                        <p:attrNameLst>
+                                          <p:attrName>style.visibility</p:attrName>
+                                        </p:attrNameLst>
+                                      </p:cBhvr>
+                                      <p:to>
+                                        <p:strVal val="visible"/>
+                                      </p:to>
+                                    </p:set>
+                                  </p:childTnLst>
+                                </p:cTn>
+                              </p:par>
+                              <p:par>
+                                <p:cTn id="15" presetID="1" presetClass="entr" presetSubtype="0" fill="hold" nodeType="withEffect">
+                                  <p:stCondLst>
+                                    <p:cond delay="0"/>
+                                  </p:stCondLst>
+                                  <p:childTnLst>
+                                    <p:set>
+                                      <p:cBhvr>
+                                        <p:cTn id="16" dur="1" fill="hold">
+                                          <p:stCondLst>
+                                            <p:cond delay="0"/>
+                                          </p:stCondLst>
+                                        </p:cTn>
+                                        <p:tgtEl>
+                                          <p:spTgt spid="3">
+                                            <p:txEl>
+                                              <p:pRg st="7" end="7"/>
+                                            </p:txEl>
+                                          </p:spTgt>
+                                        </p:tgtEl>
+                                        <p:attrNameLst>
+                                          <p:attrName>style.visibility</p:attrName>
+                                        </p:attrNameLst>
+                                      </p:cBhvr>
+                                      <p:to>
+                                        <p:strVal val="visible"/>
+                                      </p:to>
+                                    </p:set>
+                                  </p:childTnLst>
+                                </p:cTn>
+                              </p:par>
+                            </p:childTnLst>
+                          </p:cTn>
+                        </p:par>
+                      </p:childTnLst>
+                    </p:cTn>
+                  </p:par>
+                </p:childTnLst>
+              </p:cTn>
+              <p:prevCondLst>
+                <p:cond evt="onPrev" delay="0">
+                  <p:tgtEl>
+                    <p:sldTgt/>
+                  </p:tgtEl>
+                </p:cond>
+              </p:prevCondLst>
+              <p:nextCondLst>
+                <p:cond evt="onNext" delay="0">
+                  <p:tgtEl>
+                    <p:sldTgt/>
+                  </p:tgtEl>
+                </p:cond>
+              </p:nextCondLst>
+            </p:seq>
+          </p:childTnLst>
+        </p:cTn>
+      </p:par>
+    </p:tnLst>
+  </p:timing>
+</p:sld>
+</file>
+
+<file path=ppt/slides/slide15.xml><?xml version="1.0" encoding="utf-8"?>
+<p:sld xmlns:a="http://schemas.openxmlformats.org/drawingml/2006/main" xmlns:r="http://schemas.openxmlformats.org/officeDocument/2006/relationships" xmlns:p="http://schemas.openxmlformats.org/presentationml/2006/main">
+  <p:cSld>
+    <p:spTree>
+      <p:nvGrpSpPr>
+        <p:cNvPr id="1" name=""/>
+        <p:cNvGrpSpPr/>
+        <p:nvPr/>
+      </p:nvGrpSpPr>
+      <p:grpSpPr>
+        <a:xfrm>
+          <a:off x="0" y="0"/>
+          <a:ext cx="0" cy="0"/>
+          <a:chOff x="0" y="0"/>
+          <a:chExt cx="0" cy="0"/>
+        </a:xfrm>
+      </p:grpSpPr>
+      <p:sp>
+        <p:nvSpPr>
+          <p:cNvPr id="2" name="Title 1">
+            <a:extLst>
+              <a:ext uri="{FF2B5EF4-FFF2-40B4-BE49-F238E27FC236}">
+                <a16:creationId xmlns:a16="http://schemas.microsoft.com/office/drawing/2014/main" id="{B5AB8D85-BBC4-0A46-938C-6228C5CDA09A}"/>
+              </a:ext>
+            </a:extLst>
+          </p:cNvPr>
+          <p:cNvSpPr>
+            <a:spLocks noGrp="1"/>
+          </p:cNvSpPr>
+          <p:nvPr>
+            <p:ph type="title"/>
+          </p:nvPr>
+        </p:nvSpPr>
+        <p:spPr>
+          <a:xfrm>
+            <a:off x="838200" y="34698"/>
+            <a:ext cx="10515600" cy="1325563"/>
+          </a:xfrm>
+        </p:spPr>
+        <p:txBody>
+          <a:bodyPr/>
+          <a:lstStyle/>
+          <a:p>
+            <a:r>
+              <a:rPr lang="en-US" dirty="0"/>
+              <a:t>Exception handling</a:t>
+            </a:r>
+          </a:p>
+        </p:txBody>
+      </p:sp>
+      <p:sp>
+        <p:nvSpPr>
+          <p:cNvPr id="3" name="Content Placeholder 2">
+            <a:extLst>
+              <a:ext uri="{FF2B5EF4-FFF2-40B4-BE49-F238E27FC236}">
+                <a16:creationId xmlns:a16="http://schemas.microsoft.com/office/drawing/2014/main" id="{27D3C46E-8A55-774D-A315-730A24424D2A}"/>
+              </a:ext>
+            </a:extLst>
+          </p:cNvPr>
+          <p:cNvSpPr>
+            <a:spLocks noGrp="1"/>
+          </p:cNvSpPr>
+          <p:nvPr>
+            <p:ph idx="1"/>
+          </p:nvPr>
+        </p:nvSpPr>
+        <p:spPr>
+          <a:xfrm>
+            <a:off x="838199" y="1175595"/>
+            <a:ext cx="6302339" cy="4506809"/>
+          </a:xfrm>
+        </p:spPr>
+        <p:txBody>
+          <a:bodyPr>
+            <a:noAutofit/>
+          </a:bodyPr>
+          <a:lstStyle/>
+          <a:p>
+            <a:pPr marL="0" indent="0">
+              <a:buNone/>
+            </a:pPr>
+            <a:r>
+              <a:rPr lang="en-GB" sz="1600" dirty="0">
+                <a:latin typeface="Consolas" panose="020B0609020204030204" pitchFamily="49" charset="0"/>
+                <a:cs typeface="Consolas" panose="020B0609020204030204" pitchFamily="49" charset="0"/>
+              </a:rPr>
+              <a:t>def </a:t>
+            </a:r>
+            <a:r>
+              <a:rPr lang="en-GB" sz="1600" dirty="0" err="1">
+                <a:latin typeface="Consolas" panose="020B0609020204030204" pitchFamily="49" charset="0"/>
+                <a:cs typeface="Consolas" panose="020B0609020204030204" pitchFamily="49" charset="0"/>
+              </a:rPr>
+              <a:t>demo_errors</a:t>
+            </a:r>
+            <a:r>
+              <a:rPr lang="en-GB" sz="1600" dirty="0">
+                <a:latin typeface="Consolas" panose="020B0609020204030204" pitchFamily="49" charset="0"/>
+                <a:cs typeface="Consolas" panose="020B0609020204030204" pitchFamily="49" charset="0"/>
+              </a:rPr>
+              <a:t>():</a:t>
+            </a:r>
+          </a:p>
+          <a:p>
+            <a:pPr marL="457200" lvl="1" indent="0">
+              <a:buNone/>
+            </a:pPr>
+            <a:r>
+              <a:rPr lang="en-GB" sz="1600" dirty="0">
+                <a:latin typeface="Consolas" panose="020B0609020204030204" pitchFamily="49" charset="0"/>
+                <a:cs typeface="Consolas" panose="020B0609020204030204" pitchFamily="49" charset="0"/>
+              </a:rPr>
+              <a:t>try:</a:t>
+            </a:r>
+          </a:p>
+          <a:p>
+            <a:pPr marL="914400" lvl="2" indent="0">
+              <a:buNone/>
+            </a:pPr>
+            <a:r>
+              <a:rPr lang="en-GB" sz="1600" dirty="0">
+                <a:latin typeface="Consolas" panose="020B0609020204030204" pitchFamily="49" charset="0"/>
+                <a:cs typeface="Consolas" panose="020B0609020204030204" pitchFamily="49" charset="0"/>
+              </a:rPr>
+              <a:t>d = </a:t>
+            </a:r>
+            <a:r>
+              <a:rPr lang="en-GB" sz="1600" dirty="0" err="1">
+                <a:latin typeface="Consolas" panose="020B0609020204030204" pitchFamily="49" charset="0"/>
+                <a:cs typeface="Consolas" panose="020B0609020204030204" pitchFamily="49" charset="0"/>
+              </a:rPr>
+              <a:t>dict</a:t>
+            </a:r>
+            <a:r>
+              <a:rPr lang="en-GB" sz="1600" dirty="0">
+                <a:latin typeface="Consolas" panose="020B0609020204030204" pitchFamily="49" charset="0"/>
+                <a:cs typeface="Consolas" panose="020B0609020204030204" pitchFamily="49" charset="0"/>
+              </a:rPr>
+              <a:t>()</a:t>
+            </a:r>
+          </a:p>
+          <a:p>
+            <a:pPr marL="914400" lvl="2" indent="0">
+              <a:buNone/>
+            </a:pPr>
+            <a:r>
+              <a:rPr lang="en-GB" sz="1600" dirty="0">
+                <a:latin typeface="Consolas" panose="020B0609020204030204" pitchFamily="49" charset="0"/>
+                <a:cs typeface="Consolas" panose="020B0609020204030204" pitchFamily="49" charset="0"/>
+              </a:rPr>
+              <a:t>for </a:t>
+            </a:r>
+            <a:r>
+              <a:rPr lang="en-GB" sz="1600" dirty="0" err="1">
+                <a:latin typeface="Consolas" panose="020B0609020204030204" pitchFamily="49" charset="0"/>
+                <a:cs typeface="Consolas" panose="020B0609020204030204" pitchFamily="49" charset="0"/>
+              </a:rPr>
+              <a:t>i</a:t>
+            </a:r>
+            <a:r>
+              <a:rPr lang="en-GB" sz="1600" dirty="0">
+                <a:latin typeface="Consolas" panose="020B0609020204030204" pitchFamily="49" charset="0"/>
+                <a:cs typeface="Consolas" panose="020B0609020204030204" pitchFamily="49" charset="0"/>
+              </a:rPr>
+              <a:t> in range(5):</a:t>
+            </a:r>
+          </a:p>
+          <a:p>
+            <a:pPr marL="914400" lvl="2" indent="0">
+              <a:buNone/>
+            </a:pPr>
+            <a:r>
+              <a:rPr lang="en-GB" sz="1600" dirty="0">
+                <a:latin typeface="Consolas" panose="020B0609020204030204" pitchFamily="49" charset="0"/>
+                <a:cs typeface="Consolas" panose="020B0609020204030204" pitchFamily="49" charset="0"/>
+              </a:rPr>
+              <a:t>d[</a:t>
+            </a:r>
+            <a:r>
+              <a:rPr lang="en-GB" sz="1600" dirty="0" err="1">
+                <a:latin typeface="Consolas" panose="020B0609020204030204" pitchFamily="49" charset="0"/>
+                <a:cs typeface="Consolas" panose="020B0609020204030204" pitchFamily="49" charset="0"/>
+              </a:rPr>
+              <a:t>i</a:t>
+            </a:r>
+            <a:r>
+              <a:rPr lang="en-GB" sz="1600" dirty="0">
+                <a:latin typeface="Consolas" panose="020B0609020204030204" pitchFamily="49" charset="0"/>
+                <a:cs typeface="Consolas" panose="020B0609020204030204" pitchFamily="49" charset="0"/>
+              </a:rPr>
+              <a:t>] = </a:t>
+            </a:r>
+            <a:r>
+              <a:rPr lang="en-GB" sz="1600" dirty="0" err="1">
+                <a:latin typeface="Consolas" panose="020B0609020204030204" pitchFamily="49" charset="0"/>
+                <a:cs typeface="Consolas" panose="020B0609020204030204" pitchFamily="49" charset="0"/>
+              </a:rPr>
+              <a:t>i</a:t>
+            </a:r>
+            <a:r>
+              <a:rPr lang="en-GB" sz="1600" dirty="0">
+                <a:latin typeface="Consolas" panose="020B0609020204030204" pitchFamily="49" charset="0"/>
+                <a:cs typeface="Consolas" panose="020B0609020204030204" pitchFamily="49" charset="0"/>
+              </a:rPr>
+              <a:t> * 100 </a:t>
+            </a:r>
+          </a:p>
+          <a:p>
+            <a:pPr marL="914400" lvl="2" indent="0">
+              <a:buNone/>
+            </a:pPr>
+            <a:r>
+              <a:rPr lang="en-GB" sz="1600" dirty="0">
+                <a:latin typeface="Consolas" panose="020B0609020204030204" pitchFamily="49" charset="0"/>
+                <a:cs typeface="Consolas" panose="020B0609020204030204" pitchFamily="49" charset="0"/>
+              </a:rPr>
+              <a:t>for </a:t>
+            </a:r>
+            <a:r>
+              <a:rPr lang="en-GB" sz="1600" dirty="0" err="1">
+                <a:latin typeface="Consolas" panose="020B0609020204030204" pitchFamily="49" charset="0"/>
+                <a:cs typeface="Consolas" panose="020B0609020204030204" pitchFamily="49" charset="0"/>
+              </a:rPr>
+              <a:t>i</a:t>
+            </a:r>
+            <a:r>
+              <a:rPr lang="en-GB" sz="1600" dirty="0">
+                <a:latin typeface="Consolas" panose="020B0609020204030204" pitchFamily="49" charset="0"/>
+                <a:cs typeface="Consolas" panose="020B0609020204030204" pitchFamily="49" charset="0"/>
+              </a:rPr>
+              <a:t> in range(100):</a:t>
+            </a:r>
+          </a:p>
+          <a:p>
+            <a:pPr marL="914400" lvl="2" indent="0">
+              <a:buNone/>
+            </a:pPr>
+            <a:r>
+              <a:rPr lang="en-GB" sz="1600" dirty="0">
+                <a:latin typeface="Consolas" panose="020B0609020204030204" pitchFamily="49" charset="0"/>
+                <a:cs typeface="Consolas" panose="020B0609020204030204" pitchFamily="49" charset="0"/>
+              </a:rPr>
+              <a:t>a: int = </a:t>
+            </a:r>
+            <a:r>
+              <a:rPr lang="en-GB" sz="1600" dirty="0" err="1">
+                <a:latin typeface="Consolas" panose="020B0609020204030204" pitchFamily="49" charset="0"/>
+                <a:cs typeface="Consolas" panose="020B0609020204030204" pitchFamily="49" charset="0"/>
+              </a:rPr>
+              <a:t>r.randint</a:t>
+            </a:r>
+            <a:r>
+              <a:rPr lang="en-GB" sz="1600" dirty="0">
+                <a:latin typeface="Consolas" panose="020B0609020204030204" pitchFamily="49" charset="0"/>
+                <a:cs typeface="Consolas" panose="020B0609020204030204" pitchFamily="49" charset="0"/>
+              </a:rPr>
+              <a:t>(2, 20)</a:t>
+            </a:r>
+          </a:p>
+          <a:p>
+            <a:pPr marL="914400" lvl="2" indent="0">
+              <a:buNone/>
+            </a:pPr>
+            <a:r>
+              <a:rPr lang="en-GB" sz="1600" dirty="0">
+                <a:latin typeface="Consolas" panose="020B0609020204030204" pitchFamily="49" charset="0"/>
+                <a:cs typeface="Consolas" panose="020B0609020204030204" pitchFamily="49" charset="0"/>
+              </a:rPr>
+              <a:t>b: int = </a:t>
+            </a:r>
+            <a:r>
+              <a:rPr lang="en-GB" sz="1600" dirty="0" err="1">
+                <a:latin typeface="Consolas" panose="020B0609020204030204" pitchFamily="49" charset="0"/>
+                <a:cs typeface="Consolas" panose="020B0609020204030204" pitchFamily="49" charset="0"/>
+              </a:rPr>
+              <a:t>r.randint</a:t>
+            </a:r>
+            <a:r>
+              <a:rPr lang="en-GB" sz="1600" dirty="0">
+                <a:latin typeface="Consolas" panose="020B0609020204030204" pitchFamily="49" charset="0"/>
+                <a:cs typeface="Consolas" panose="020B0609020204030204" pitchFamily="49" charset="0"/>
+              </a:rPr>
+              <a:t>(-1, 1)</a:t>
+            </a:r>
+          </a:p>
+          <a:p>
+            <a:pPr marL="914400" lvl="2" indent="0">
+              <a:buNone/>
+            </a:pPr>
+            <a:r>
+              <a:rPr lang="en-GB" sz="1600" dirty="0">
+                <a:latin typeface="Consolas" panose="020B0609020204030204" pitchFamily="49" charset="0"/>
+                <a:cs typeface="Consolas" panose="020B0609020204030204" pitchFamily="49" charset="0"/>
+              </a:rPr>
+              <a:t>c: int = a / b	</a:t>
+            </a:r>
+            <a:r>
+              <a:rPr lang="en-GB" sz="1600" dirty="0">
+                <a:solidFill>
+                  <a:srgbClr val="FF0000"/>
+                </a:solidFill>
+                <a:latin typeface="Consolas" panose="020B0609020204030204" pitchFamily="49" charset="0"/>
+                <a:cs typeface="Consolas" panose="020B0609020204030204" pitchFamily="49" charset="0"/>
+              </a:rPr>
+              <a:t># Can raise </a:t>
+            </a:r>
+            <a:r>
+              <a:rPr lang="en-GB" sz="1600" dirty="0" err="1">
+                <a:solidFill>
+                  <a:srgbClr val="FF0000"/>
+                </a:solidFill>
+                <a:latin typeface="Consolas" panose="020B0609020204030204" pitchFamily="49" charset="0"/>
+                <a:cs typeface="Consolas" panose="020B0609020204030204" pitchFamily="49" charset="0"/>
+              </a:rPr>
+              <a:t>ZeroDivisionError</a:t>
+            </a:r>
+            <a:endParaRPr lang="en-GB" sz="1600" dirty="0">
+              <a:solidFill>
+                <a:srgbClr val="FF0000"/>
+              </a:solidFill>
+              <a:latin typeface="Consolas" panose="020B0609020204030204" pitchFamily="49" charset="0"/>
+              <a:cs typeface="Consolas" panose="020B0609020204030204" pitchFamily="49" charset="0"/>
+            </a:endParaRPr>
+          </a:p>
+          <a:p>
+            <a:pPr marL="914400" lvl="2" indent="0">
+              <a:buNone/>
+            </a:pPr>
+            <a:r>
+              <a:rPr lang="en-GB" sz="1600" dirty="0">
+                <a:latin typeface="Consolas" panose="020B0609020204030204" pitchFamily="49" charset="0"/>
+                <a:cs typeface="Consolas" panose="020B0609020204030204" pitchFamily="49" charset="0"/>
+              </a:rPr>
+              <a:t>print (c)</a:t>
+            </a:r>
+          </a:p>
+          <a:p>
+            <a:pPr marL="914400" lvl="2" indent="0">
+              <a:buNone/>
+            </a:pPr>
+            <a:br>
+              <a:rPr lang="en-GB" sz="1600" dirty="0">
+                <a:latin typeface="Consolas" panose="020B0609020204030204" pitchFamily="49" charset="0"/>
+                <a:cs typeface="Consolas" panose="020B0609020204030204" pitchFamily="49" charset="0"/>
+              </a:rPr>
+            </a:br>
+            <a:r>
+              <a:rPr lang="en-GB" sz="1600" dirty="0">
+                <a:latin typeface="Consolas" panose="020B0609020204030204" pitchFamily="49" charset="0"/>
+                <a:cs typeface="Consolas" panose="020B0609020204030204" pitchFamily="49" charset="0"/>
+              </a:rPr>
+              <a:t>print(d[c])	</a:t>
+            </a:r>
+            <a:r>
+              <a:rPr lang="en-GB" sz="1600" dirty="0">
+                <a:solidFill>
+                  <a:srgbClr val="FF0000"/>
+                </a:solidFill>
+                <a:latin typeface="Consolas" panose="020B0609020204030204" pitchFamily="49" charset="0"/>
+                <a:cs typeface="Consolas" panose="020B0609020204030204" pitchFamily="49" charset="0"/>
+              </a:rPr>
+              <a:t># Can raise </a:t>
+            </a:r>
+            <a:r>
+              <a:rPr lang="en-GB" sz="1600" dirty="0" err="1">
+                <a:solidFill>
+                  <a:srgbClr val="FF0000"/>
+                </a:solidFill>
+                <a:latin typeface="Consolas" panose="020B0609020204030204" pitchFamily="49" charset="0"/>
+                <a:cs typeface="Consolas" panose="020B0609020204030204" pitchFamily="49" charset="0"/>
+              </a:rPr>
+              <a:t>KeyError</a:t>
+            </a:r>
+            <a:endParaRPr lang="en-GB" sz="1600" dirty="0">
+              <a:solidFill>
+                <a:srgbClr val="FF0000"/>
+              </a:solidFill>
+              <a:latin typeface="Consolas" panose="020B0609020204030204" pitchFamily="49" charset="0"/>
+              <a:cs typeface="Consolas" panose="020B0609020204030204" pitchFamily="49" charset="0"/>
+            </a:endParaRPr>
+          </a:p>
+          <a:p>
+            <a:pPr marL="457200" lvl="1" indent="0">
+              <a:buNone/>
+            </a:pPr>
+            <a:r>
+              <a:rPr lang="en-GB" sz="1600" dirty="0">
+                <a:latin typeface="Consolas" panose="020B0609020204030204" pitchFamily="49" charset="0"/>
+                <a:cs typeface="Consolas" panose="020B0609020204030204" pitchFamily="49" charset="0"/>
+              </a:rPr>
+              <a:t>except </a:t>
+            </a:r>
+            <a:r>
+              <a:rPr lang="en-GB" sz="1600" dirty="0" err="1">
+                <a:latin typeface="Consolas" panose="020B0609020204030204" pitchFamily="49" charset="0"/>
+                <a:cs typeface="Consolas" panose="020B0609020204030204" pitchFamily="49" charset="0"/>
+              </a:rPr>
+              <a:t>ZeroDivisionError</a:t>
+            </a:r>
+            <a:r>
+              <a:rPr lang="en-GB" sz="1600" dirty="0">
+                <a:latin typeface="Consolas" panose="020B0609020204030204" pitchFamily="49" charset="0"/>
+                <a:cs typeface="Consolas" panose="020B0609020204030204" pitchFamily="49" charset="0"/>
+              </a:rPr>
+              <a:t>:</a:t>
+            </a:r>
+          </a:p>
+          <a:p>
+            <a:pPr marL="457200" lvl="1" indent="0">
+              <a:buNone/>
+            </a:pPr>
+            <a:r>
+              <a:rPr lang="en-GB" sz="1600" dirty="0">
+                <a:latin typeface="Consolas" panose="020B0609020204030204" pitchFamily="49" charset="0"/>
+                <a:cs typeface="Consolas" panose="020B0609020204030204" pitchFamily="49" charset="0"/>
+              </a:rPr>
+              <a:t>	print ("</a:t>
+            </a:r>
+            <a:r>
+              <a:rPr lang="en-GB" sz="1600" dirty="0" err="1">
+                <a:latin typeface="Consolas" panose="020B0609020204030204" pitchFamily="49" charset="0"/>
+                <a:cs typeface="Consolas" panose="020B0609020204030204" pitchFamily="49" charset="0"/>
+              </a:rPr>
+              <a:t>DivByZero</a:t>
+            </a:r>
+            <a:r>
+              <a:rPr lang="en-GB" sz="1600" dirty="0">
+                <a:latin typeface="Consolas" panose="020B0609020204030204" pitchFamily="49" charset="0"/>
+                <a:cs typeface="Consolas" panose="020B0609020204030204" pitchFamily="49" charset="0"/>
+              </a:rPr>
+              <a:t>")</a:t>
+            </a:r>
+          </a:p>
+          <a:p>
+            <a:pPr marL="457200" lvl="1" indent="0">
+              <a:buNone/>
+            </a:pPr>
+            <a:r>
+              <a:rPr lang="en-GB" sz="1600" dirty="0">
+                <a:latin typeface="Consolas" panose="020B0609020204030204" pitchFamily="49" charset="0"/>
+                <a:cs typeface="Consolas" panose="020B0609020204030204" pitchFamily="49" charset="0"/>
+              </a:rPr>
+              <a:t>except:</a:t>
+            </a:r>
+          </a:p>
+          <a:p>
+            <a:pPr marL="457200" lvl="1" indent="0">
+              <a:buNone/>
+            </a:pPr>
+            <a:r>
+              <a:rPr lang="en-GB" sz="1600" dirty="0">
+                <a:latin typeface="Consolas" panose="020B0609020204030204" pitchFamily="49" charset="0"/>
+                <a:cs typeface="Consolas" panose="020B0609020204030204" pitchFamily="49" charset="0"/>
+              </a:rPr>
+              <a:t>	print("Unexpected error:", </a:t>
+            </a:r>
+            <a:r>
+              <a:rPr lang="en-GB" sz="1600" dirty="0" err="1">
+                <a:latin typeface="Consolas" panose="020B0609020204030204" pitchFamily="49" charset="0"/>
+                <a:cs typeface="Consolas" panose="020B0609020204030204" pitchFamily="49" charset="0"/>
+              </a:rPr>
+              <a:t>sys.exc_info</a:t>
+            </a:r>
+            <a:r>
+              <a:rPr lang="en-GB" sz="1600" dirty="0">
+                <a:latin typeface="Consolas" panose="020B0609020204030204" pitchFamily="49" charset="0"/>
+                <a:cs typeface="Consolas" panose="020B0609020204030204" pitchFamily="49" charset="0"/>
+              </a:rPr>
+              <a:t>()[0])</a:t>
+            </a:r>
+          </a:p>
+          <a:p>
+            <a:pPr marL="0" indent="0">
+              <a:buNone/>
+            </a:pPr>
+            <a:br>
+              <a:rPr lang="en-GB" sz="1600" dirty="0">
+                <a:latin typeface="Consolas" panose="020B0609020204030204" pitchFamily="49" charset="0"/>
+                <a:cs typeface="Consolas" panose="020B0609020204030204" pitchFamily="49" charset="0"/>
+              </a:rPr>
+            </a:br>
+            <a:r>
+              <a:rPr lang="en-GB" sz="1600" dirty="0" err="1">
+                <a:latin typeface="Consolas" panose="020B0609020204030204" pitchFamily="49" charset="0"/>
+                <a:cs typeface="Consolas" panose="020B0609020204030204" pitchFamily="49" charset="0"/>
+              </a:rPr>
+              <a:t>demo_errors</a:t>
+            </a:r>
+            <a:r>
+              <a:rPr lang="en-GB" sz="1600" dirty="0">
+                <a:latin typeface="Consolas" panose="020B0609020204030204" pitchFamily="49" charset="0"/>
+                <a:cs typeface="Consolas" panose="020B0609020204030204" pitchFamily="49" charset="0"/>
+              </a:rPr>
+              <a:t>()</a:t>
+            </a:r>
+          </a:p>
+          <a:p>
+            <a:endParaRPr lang="en-US" sz="1600" dirty="0">
+              <a:latin typeface="Consolas" panose="020B0609020204030204" pitchFamily="49" charset="0"/>
+              <a:cs typeface="Consolas" panose="020B0609020204030204" pitchFamily="49" charset="0"/>
+            </a:endParaRPr>
+          </a:p>
+        </p:txBody>
+      </p:sp>
+      <p:sp>
+        <p:nvSpPr>
+          <p:cNvPr id="4" name="TextBox 3">
+            <a:extLst>
+              <a:ext uri="{FF2B5EF4-FFF2-40B4-BE49-F238E27FC236}">
+                <a16:creationId xmlns:a16="http://schemas.microsoft.com/office/drawing/2014/main" id="{188EE37A-7D99-DF4B-B618-063DEC03289D}"/>
+              </a:ext>
+            </a:extLst>
+          </p:cNvPr>
+          <p:cNvSpPr txBox="1"/>
+          <p:nvPr/>
+        </p:nvSpPr>
+        <p:spPr>
+          <a:xfrm>
+            <a:off x="8315058" y="2196269"/>
+            <a:ext cx="2337499" cy="369332"/>
+          </a:xfrm>
+          <a:prstGeom prst="rect">
+            <a:avLst/>
+          </a:prstGeom>
+          <a:noFill/>
+        </p:spPr>
+        <p:txBody>
+          <a:bodyPr wrap="none" rtlCol="0">
+            <a:spAutoFit/>
+          </a:bodyPr>
+          <a:lstStyle/>
+          <a:p>
+            <a:r>
+              <a:rPr lang="en-GB" i="1" dirty="0" err="1">
+                <a:solidFill>
+                  <a:schemeClr val="tx2">
+                    <a:lumMod val="75000"/>
+                  </a:schemeClr>
+                </a:solidFill>
+                <a:latin typeface="Consolas" panose="020B0609020204030204" pitchFamily="49" charset="0"/>
+                <a:cs typeface="Consolas" panose="020B0609020204030204" pitchFamily="49" charset="0"/>
+              </a:rPr>
+              <a:t>ZeroDivisionError</a:t>
+            </a:r>
+            <a:endParaRPr lang="en-US" i="1" dirty="0">
+              <a:solidFill>
+                <a:schemeClr val="tx2">
+                  <a:lumMod val="75000"/>
+                </a:schemeClr>
+              </a:solidFill>
+            </a:endParaRPr>
+          </a:p>
+        </p:txBody>
+      </p:sp>
+      <p:sp>
+        <p:nvSpPr>
+          <p:cNvPr id="5" name="TextBox 4">
+            <a:extLst>
+              <a:ext uri="{FF2B5EF4-FFF2-40B4-BE49-F238E27FC236}">
+                <a16:creationId xmlns:a16="http://schemas.microsoft.com/office/drawing/2014/main" id="{77774B59-BE21-8440-B7A1-1A2ABE2BE853}"/>
+              </a:ext>
+            </a:extLst>
+          </p:cNvPr>
+          <p:cNvSpPr txBox="1"/>
+          <p:nvPr/>
+        </p:nvSpPr>
+        <p:spPr>
+          <a:xfrm>
+            <a:off x="8884925" y="3244334"/>
+            <a:ext cx="1197764" cy="369332"/>
+          </a:xfrm>
+          <a:prstGeom prst="rect">
+            <a:avLst/>
+          </a:prstGeom>
+          <a:noFill/>
+        </p:spPr>
+        <p:txBody>
+          <a:bodyPr wrap="none" rtlCol="0">
+            <a:spAutoFit/>
+          </a:bodyPr>
+          <a:lstStyle/>
+          <a:p>
+            <a:r>
+              <a:rPr lang="en-GB" i="1" dirty="0" err="1">
+                <a:solidFill>
+                  <a:schemeClr val="tx2">
+                    <a:lumMod val="75000"/>
+                  </a:schemeClr>
+                </a:solidFill>
+                <a:latin typeface="Consolas" panose="020B0609020204030204" pitchFamily="49" charset="0"/>
+                <a:cs typeface="Consolas" panose="020B0609020204030204" pitchFamily="49" charset="0"/>
+              </a:rPr>
+              <a:t>KeyError</a:t>
+            </a:r>
+            <a:endParaRPr lang="en-US" i="1" dirty="0">
+              <a:solidFill>
+                <a:schemeClr val="tx2">
+                  <a:lumMod val="75000"/>
+                </a:schemeClr>
+              </a:solidFill>
+            </a:endParaRPr>
+          </a:p>
+        </p:txBody>
+      </p:sp>
+    </p:spTree>
+    <p:extLst>
+      <p:ext uri="{BB962C8B-B14F-4D97-AF65-F5344CB8AC3E}">
+        <p14:creationId xmlns:p14="http://schemas.microsoft.com/office/powerpoint/2010/main" val="2289548541"/>
+      </p:ext>
+    </p:extLst>
+  </p:cSld>
+  <p:clrMapOvr>
+    <a:masterClrMapping/>
+  </p:clrMapOvr>
+  <p:timing>
+    <p:tnLst>
+      <p:par>
+        <p:cTn id="1" dur="indefinite" restart="never" nodeType="tmRoot">
+          <p:childTnLst>
+            <p:seq concurrent="1" nextAc="seek">
+              <p:cTn id="2" dur="indefinite" nodeType="mainSeq">
+                <p:childTnLst>
+                  <p:par>
+                    <p:cTn id="3" fill="hold">
+                      <p:stCondLst>
+                        <p:cond delay="indefinite"/>
+                      </p:stCondLst>
+                      <p:childTnLst>
+                        <p:par>
+                          <p:cTn id="4" fill="hold">
+                            <p:stCondLst>
+                              <p:cond delay="0"/>
+                            </p:stCondLst>
+                            <p:childTnLst>
+                              <p:par>
+                                <p:cTn id="5" presetID="1" presetClass="entr" presetSubtype="0" fill="hold" grpId="0" nodeType="clickEffect">
+                                  <p:stCondLst>
+                                    <p:cond delay="0"/>
+                                  </p:stCondLst>
+                                  <p:childTnLst>
+                                    <p:set>
+                                      <p:cBhvr>
+                                        <p:cTn id="6" dur="1" fill="hold">
+                                          <p:stCondLst>
+                                            <p:cond delay="0"/>
+                                          </p:stCondLst>
+                                        </p:cTn>
+                                        <p:tgtEl>
+                                          <p:spTgt spid="4"/>
+                                        </p:tgtEl>
+                                        <p:attrNameLst>
+                                          <p:attrName>style.visibility</p:attrName>
+                                        </p:attrNameLst>
+                                      </p:cBhvr>
+                                      <p:to>
+                                        <p:strVal val="visible"/>
+                                      </p:to>
+                                    </p:set>
+                                  </p:childTnLst>
+                                </p:cTn>
+                              </p:par>
+                            </p:childTnLst>
+                          </p:cTn>
+                        </p:par>
+                      </p:childTnLst>
+                    </p:cTn>
+                  </p:par>
+                  <p:par>
+                    <p:cTn id="7" fill="hold">
+                      <p:stCondLst>
+                        <p:cond delay="indefinite"/>
+                      </p:stCondLst>
+                      <p:childTnLst>
+                        <p:par>
+                          <p:cTn id="8" fill="hold">
+                            <p:stCondLst>
+                              <p:cond delay="0"/>
+                            </p:stCondLst>
+                            <p:childTnLst>
+                              <p:par>
+                                <p:cTn id="9" presetID="1" presetClass="entr" presetSubtype="0" fill="hold" grpId="0" nodeType="clickEffect">
+                                  <p:stCondLst>
+                                    <p:cond delay="0"/>
+                                  </p:stCondLst>
+                                  <p:childTnLst>
+                                    <p:set>
+                                      <p:cBhvr>
+                                        <p:cTn id="10" dur="1" fill="hold">
+                                          <p:stCondLst>
+                                            <p:cond delay="0"/>
+                                          </p:stCondLst>
+                                        </p:cTn>
+                                        <p:tgtEl>
+                                          <p:spTgt spid="5"/>
+                                        </p:tgtEl>
+                                        <p:attrNameLst>
+                                          <p:attrName>style.visibility</p:attrName>
+                                        </p:attrNameLst>
+                                      </p:cBhvr>
+                                      <p:to>
+                                        <p:strVal val="visible"/>
+                                      </p:to>
+                                    </p:set>
+                                  </p:childTnLst>
+                                </p:cTn>
+                              </p:par>
+                            </p:childTnLst>
+                          </p:cTn>
+                        </p:par>
+                      </p:childTnLst>
+                    </p:cTn>
+                  </p:par>
+                </p:childTnLst>
+              </p:cTn>
+              <p:prevCondLst>
+                <p:cond evt="onPrev" delay="0">
+                  <p:tgtEl>
+                    <p:sldTgt/>
+                  </p:tgtEl>
+                </p:cond>
+              </p:prevCondLst>
+              <p:nextCondLst>
+                <p:cond evt="onNext" delay="0">
+                  <p:tgtEl>
+                    <p:sldTgt/>
+                  </p:tgtEl>
+                </p:cond>
+              </p:nextCondLst>
+            </p:seq>
+          </p:childTnLst>
+        </p:cTn>
+      </p:par>
+    </p:tnLst>
+    <p:bldLst>
+      <p:bldP spid="4" grpId="0"/>
+      <p:bldP spid="5" grpId="0"/>
+    </p:bldLst>
+  </p:timing>
+</p:sld>
+</file>
+
+<file path=ppt/slides/slide16.xml><?xml version="1.0" encoding="utf-8"?>
 <p:sld xmlns:a="http://schemas.openxmlformats.org/drawingml/2006/main" xmlns:r="http://schemas.openxmlformats.org/officeDocument/2006/relationships" xmlns:p="http://schemas.openxmlformats.org/presentationml/2006/main">
   <p:cSld>
     <p:spTree>
@@ -5389,7 +6924,7 @@
 </p:sld>
 </file>
 
-<file path=ppt/slides/slide14.xml><?xml version="1.0" encoding="utf-8"?>
+<file path=ppt/slides/slide17.xml><?xml version="1.0" encoding="utf-8"?>
 <p:sld xmlns:a="http://schemas.openxmlformats.org/drawingml/2006/main" xmlns:r="http://schemas.openxmlformats.org/officeDocument/2006/relationships" xmlns:p="http://schemas.openxmlformats.org/presentationml/2006/main">
   <p:cSld>
     <p:spTree>
@@ -5626,7 +7161,7 @@
 </p:sld>
 </file>
 
-<file path=ppt/slides/slide15.xml><?xml version="1.0" encoding="utf-8"?>
+<file path=ppt/slides/slide18.xml><?xml version="1.0" encoding="utf-8"?>
 <p:sld xmlns:a="http://schemas.openxmlformats.org/drawingml/2006/main" xmlns:r="http://schemas.openxmlformats.org/officeDocument/2006/relationships" xmlns:p="http://schemas.openxmlformats.org/presentationml/2006/main">
   <p:cSld>
     <p:spTree>
@@ -6095,7 +7630,7 @@
 </p:sld>
 </file>
 
-<file path=ppt/slides/slide16.xml><?xml version="1.0" encoding="utf-8"?>
+<file path=ppt/slides/slide19.xml><?xml version="1.0" encoding="utf-8"?>
 <p:sld xmlns:a="http://schemas.openxmlformats.org/drawingml/2006/main" xmlns:r="http://schemas.openxmlformats.org/officeDocument/2006/relationships" xmlns:p="http://schemas.openxmlformats.org/presentationml/2006/main">
   <p:cSld>
     <p:spTree>

</xml_diff>

<commit_message>
Fundamentals: Add Summary slides
</commit_message>
<xml_diff>
--- a/fundamentals/9-Type conversion, Files, doctest.pptx
+++ b/fundamentals/9-Type conversion, Files, doctest.pptx
@@ -279,7 +279,7 @@
           <a:p>
             <a:fld id="{B302FF2A-D2B5-8B4F-BDBF-6F9493847AEA}" type="datetimeFigureOut">
               <a:rPr lang="en-US" smtClean="0"/>
-              <a:t>9/9/20</a:t>
+              <a:t>9/12/20</a:t>
             </a:fld>
             <a:endParaRPr lang="en-US"/>
           </a:p>
@@ -479,7 +479,7 @@
           <a:p>
             <a:fld id="{B302FF2A-D2B5-8B4F-BDBF-6F9493847AEA}" type="datetimeFigureOut">
               <a:rPr lang="en-US" smtClean="0"/>
-              <a:t>9/9/20</a:t>
+              <a:t>9/12/20</a:t>
             </a:fld>
             <a:endParaRPr lang="en-US"/>
           </a:p>
@@ -689,7 +689,7 @@
           <a:p>
             <a:fld id="{B302FF2A-D2B5-8B4F-BDBF-6F9493847AEA}" type="datetimeFigureOut">
               <a:rPr lang="en-US" smtClean="0"/>
-              <a:t>9/9/20</a:t>
+              <a:t>9/12/20</a:t>
             </a:fld>
             <a:endParaRPr lang="en-US"/>
           </a:p>
@@ -889,7 +889,7 @@
           <a:p>
             <a:fld id="{B302FF2A-D2B5-8B4F-BDBF-6F9493847AEA}" type="datetimeFigureOut">
               <a:rPr lang="en-US" smtClean="0"/>
-              <a:t>9/9/20</a:t>
+              <a:t>9/12/20</a:t>
             </a:fld>
             <a:endParaRPr lang="en-US"/>
           </a:p>
@@ -1165,7 +1165,7 @@
           <a:p>
             <a:fld id="{B302FF2A-D2B5-8B4F-BDBF-6F9493847AEA}" type="datetimeFigureOut">
               <a:rPr lang="en-US" smtClean="0"/>
-              <a:t>9/9/20</a:t>
+              <a:t>9/12/20</a:t>
             </a:fld>
             <a:endParaRPr lang="en-US"/>
           </a:p>
@@ -1433,7 +1433,7 @@
           <a:p>
             <a:fld id="{B302FF2A-D2B5-8B4F-BDBF-6F9493847AEA}" type="datetimeFigureOut">
               <a:rPr lang="en-US" smtClean="0"/>
-              <a:t>9/9/20</a:t>
+              <a:t>9/12/20</a:t>
             </a:fld>
             <a:endParaRPr lang="en-US"/>
           </a:p>
@@ -1848,7 +1848,7 @@
           <a:p>
             <a:fld id="{B302FF2A-D2B5-8B4F-BDBF-6F9493847AEA}" type="datetimeFigureOut">
               <a:rPr lang="en-US" smtClean="0"/>
-              <a:t>9/9/20</a:t>
+              <a:t>9/12/20</a:t>
             </a:fld>
             <a:endParaRPr lang="en-US"/>
           </a:p>
@@ -1990,7 +1990,7 @@
           <a:p>
             <a:fld id="{B302FF2A-D2B5-8B4F-BDBF-6F9493847AEA}" type="datetimeFigureOut">
               <a:rPr lang="en-US" smtClean="0"/>
-              <a:t>9/9/20</a:t>
+              <a:t>9/12/20</a:t>
             </a:fld>
             <a:endParaRPr lang="en-US"/>
           </a:p>
@@ -2103,7 +2103,7 @@
           <a:p>
             <a:fld id="{B302FF2A-D2B5-8B4F-BDBF-6F9493847AEA}" type="datetimeFigureOut">
               <a:rPr lang="en-US" smtClean="0"/>
-              <a:t>9/9/20</a:t>
+              <a:t>9/12/20</a:t>
             </a:fld>
             <a:endParaRPr lang="en-US"/>
           </a:p>
@@ -2416,7 +2416,7 @@
           <a:p>
             <a:fld id="{B302FF2A-D2B5-8B4F-BDBF-6F9493847AEA}" type="datetimeFigureOut">
               <a:rPr lang="en-US" smtClean="0"/>
-              <a:t>9/9/20</a:t>
+              <a:t>9/12/20</a:t>
             </a:fld>
             <a:endParaRPr lang="en-US"/>
           </a:p>
@@ -2705,7 +2705,7 @@
           <a:p>
             <a:fld id="{B302FF2A-D2B5-8B4F-BDBF-6F9493847AEA}" type="datetimeFigureOut">
               <a:rPr lang="en-US" smtClean="0"/>
-              <a:t>9/9/20</a:t>
+              <a:t>9/12/20</a:t>
             </a:fld>
             <a:endParaRPr lang="en-US"/>
           </a:p>
@@ -2948,7 +2948,7 @@
           <a:p>
             <a:fld id="{B302FF2A-D2B5-8B4F-BDBF-6F9493847AEA}" type="datetimeFigureOut">
               <a:rPr lang="en-US" smtClean="0"/>
-              <a:t>9/9/20</a:t>
+              <a:t>9/12/20</a:t>
             </a:fld>
             <a:endParaRPr lang="en-US"/>
           </a:p>
@@ -5782,7 +5782,7 @@
                 <a:latin typeface="Consolas" panose="020B0609020204030204" pitchFamily="49" charset="0"/>
                 <a:cs typeface="Consolas" panose="020B0609020204030204" pitchFamily="49" charset="0"/>
               </a:rPr>
-              <a:t>d[</a:t>
+              <a:t>	d[</a:t>
             </a:r>
             <a:r>
               <a:rPr lang="en-GB" sz="1600" dirty="0" err="1">
@@ -5840,25 +5840,25 @@
             </a:r>
           </a:p>
           <a:p>
-            <a:pPr marL="914400" lvl="2" indent="0">
+            <a:pPr marL="1371600" lvl="3" indent="0">
               <a:buNone/>
             </a:pPr>
             <a:r>
-              <a:rPr lang="en-GB" sz="1600" dirty="0">
+              <a:rPr lang="en-GB" sz="1400" dirty="0">
                 <a:latin typeface="Consolas" panose="020B0609020204030204" pitchFamily="49" charset="0"/>
                 <a:cs typeface="Consolas" panose="020B0609020204030204" pitchFamily="49" charset="0"/>
               </a:rPr>
               <a:t>a: int = </a:t>
             </a:r>
             <a:r>
-              <a:rPr lang="en-GB" sz="1600" dirty="0" err="1">
+              <a:rPr lang="en-GB" sz="1400" dirty="0" err="1">
                 <a:latin typeface="Consolas" panose="020B0609020204030204" pitchFamily="49" charset="0"/>
                 <a:cs typeface="Consolas" panose="020B0609020204030204" pitchFamily="49" charset="0"/>
               </a:rPr>
               <a:t>r.randint</a:t>
             </a:r>
             <a:r>
-              <a:rPr lang="en-GB" sz="1600" dirty="0">
+              <a:rPr lang="en-GB" sz="1400" dirty="0">
                 <a:latin typeface="Consolas" panose="020B0609020204030204" pitchFamily="49" charset="0"/>
                 <a:cs typeface="Consolas" panose="020B0609020204030204" pitchFamily="49" charset="0"/>
               </a:rPr>
@@ -5866,25 +5866,25 @@
             </a:r>
           </a:p>
           <a:p>
-            <a:pPr marL="914400" lvl="2" indent="0">
+            <a:pPr marL="1371600" lvl="3" indent="0">
               <a:buNone/>
             </a:pPr>
             <a:r>
-              <a:rPr lang="en-GB" sz="1600" dirty="0">
+              <a:rPr lang="en-GB" sz="1400" dirty="0">
                 <a:latin typeface="Consolas" panose="020B0609020204030204" pitchFamily="49" charset="0"/>
                 <a:cs typeface="Consolas" panose="020B0609020204030204" pitchFamily="49" charset="0"/>
               </a:rPr>
               <a:t>b: int = </a:t>
             </a:r>
             <a:r>
-              <a:rPr lang="en-GB" sz="1600" dirty="0" err="1">
+              <a:rPr lang="en-GB" sz="1400" dirty="0" err="1">
                 <a:latin typeface="Consolas" panose="020B0609020204030204" pitchFamily="49" charset="0"/>
                 <a:cs typeface="Consolas" panose="020B0609020204030204" pitchFamily="49" charset="0"/>
               </a:rPr>
               <a:t>r.randint</a:t>
             </a:r>
             <a:r>
-              <a:rPr lang="en-GB" sz="1600" dirty="0">
+              <a:rPr lang="en-GB" sz="1400" dirty="0">
                 <a:latin typeface="Consolas" panose="020B0609020204030204" pitchFamily="49" charset="0"/>
                 <a:cs typeface="Consolas" panose="020B0609020204030204" pitchFamily="49" charset="0"/>
               </a:rPr>
@@ -5892,18 +5892,18 @@
             </a:r>
           </a:p>
           <a:p>
-            <a:pPr marL="914400" lvl="2" indent="0">
+            <a:pPr marL="1371600" lvl="3" indent="0">
               <a:buNone/>
             </a:pPr>
             <a:r>
-              <a:rPr lang="en-GB" sz="1600" dirty="0">
+              <a:rPr lang="en-GB" sz="1400" dirty="0">
                 <a:latin typeface="Consolas" panose="020B0609020204030204" pitchFamily="49" charset="0"/>
                 <a:cs typeface="Consolas" panose="020B0609020204030204" pitchFamily="49" charset="0"/>
               </a:rPr>
               <a:t>c: int = a / b	</a:t>
             </a:r>
             <a:r>
-              <a:rPr lang="en-GB" sz="1600" dirty="0">
+              <a:rPr lang="en-GB" sz="1400" dirty="0">
                 <a:solidFill>
                   <a:srgbClr val="FF0000"/>
                 </a:solidFill>
@@ -5913,7 +5913,7 @@
               <a:t># Can raise </a:t>
             </a:r>
             <a:r>
-              <a:rPr lang="en-GB" sz="1600" dirty="0" err="1">
+              <a:rPr lang="en-GB" sz="1400" dirty="0" err="1">
                 <a:solidFill>
                   <a:srgbClr val="FF0000"/>
                 </a:solidFill>
@@ -5922,7 +5922,7 @@
               </a:rPr>
               <a:t>ZeroDivisionError</a:t>
             </a:r>
-            <a:endParaRPr lang="en-GB" sz="1600" dirty="0">
+            <a:endParaRPr lang="en-GB" sz="1400" dirty="0">
               <a:solidFill>
                 <a:srgbClr val="FF0000"/>
               </a:solidFill>
@@ -5931,11 +5931,11 @@
             </a:endParaRPr>
           </a:p>
           <a:p>
-            <a:pPr marL="914400" lvl="2" indent="0">
+            <a:pPr marL="1371600" lvl="3" indent="0">
               <a:buNone/>
             </a:pPr>
             <a:r>
-              <a:rPr lang="en-GB" sz="1600" dirty="0">
+              <a:rPr lang="en-GB" sz="1400" dirty="0">
                 <a:latin typeface="Consolas" panose="020B0609020204030204" pitchFamily="49" charset="0"/>
                 <a:cs typeface="Consolas" panose="020B0609020204030204" pitchFamily="49" charset="0"/>
               </a:rPr>
@@ -5943,24 +5943,24 @@
             </a:r>
           </a:p>
           <a:p>
-            <a:pPr marL="914400" lvl="2" indent="0">
+            <a:pPr marL="1371600" lvl="3" indent="0">
               <a:buNone/>
             </a:pPr>
             <a:br>
-              <a:rPr lang="en-GB" sz="1600" dirty="0">
+              <a:rPr lang="en-GB" sz="1400" dirty="0">
                 <a:latin typeface="Consolas" panose="020B0609020204030204" pitchFamily="49" charset="0"/>
                 <a:cs typeface="Consolas" panose="020B0609020204030204" pitchFamily="49" charset="0"/>
               </a:rPr>
             </a:br>
             <a:r>
-              <a:rPr lang="en-GB" sz="1600" dirty="0">
+              <a:rPr lang="en-GB" sz="1400" dirty="0">
                 <a:latin typeface="Consolas" panose="020B0609020204030204" pitchFamily="49" charset="0"/>
                 <a:cs typeface="Consolas" panose="020B0609020204030204" pitchFamily="49" charset="0"/>
               </a:rPr>
               <a:t>print(d[c])	</a:t>
             </a:r>
             <a:r>
-              <a:rPr lang="en-GB" sz="1600" dirty="0">
+              <a:rPr lang="en-GB" sz="1400" dirty="0">
                 <a:solidFill>
                   <a:srgbClr val="FF0000"/>
                 </a:solidFill>
@@ -5970,7 +5970,7 @@
               <a:t># Can raise </a:t>
             </a:r>
             <a:r>
-              <a:rPr lang="en-GB" sz="1600" dirty="0" err="1">
+              <a:rPr lang="en-GB" sz="1400" dirty="0" err="1">
                 <a:solidFill>
                   <a:srgbClr val="FF0000"/>
                 </a:solidFill>
@@ -5979,7 +5979,7 @@
               </a:rPr>
               <a:t>KeyError</a:t>
             </a:r>
-            <a:endParaRPr lang="en-GB" sz="1600" dirty="0">
+            <a:endParaRPr lang="en-GB" sz="1400" dirty="0">
               <a:solidFill>
                 <a:srgbClr val="FF0000"/>
               </a:solidFill>
@@ -5996,7 +5996,7 @@
                 <a:latin typeface="Consolas" panose="020B0609020204030204" pitchFamily="49" charset="0"/>
                 <a:cs typeface="Consolas" panose="020B0609020204030204" pitchFamily="49" charset="0"/>
               </a:rPr>
-              <a:t>except </a:t>
+              <a:t>except (</a:t>
             </a:r>
             <a:r>
               <a:rPr lang="en-GB" sz="1600" dirty="0" err="1">
@@ -6010,7 +6010,21 @@
                 <a:latin typeface="Consolas" panose="020B0609020204030204" pitchFamily="49" charset="0"/>
                 <a:cs typeface="Consolas" panose="020B0609020204030204" pitchFamily="49" charset="0"/>
               </a:rPr>
-              <a:t>:</a:t>
+              <a:t>, </a:t>
+            </a:r>
+            <a:r>
+              <a:rPr lang="en-GB" sz="1600" dirty="0" err="1">
+                <a:latin typeface="Consolas" panose="020B0609020204030204" pitchFamily="49" charset="0"/>
+                <a:cs typeface="Consolas" panose="020B0609020204030204" pitchFamily="49" charset="0"/>
+              </a:rPr>
+              <a:t>TypeError</a:t>
+            </a:r>
+            <a:r>
+              <a:rPr lang="en-GB" sz="1600" dirty="0">
+                <a:latin typeface="Consolas" panose="020B0609020204030204" pitchFamily="49" charset="0"/>
+                <a:cs typeface="Consolas" panose="020B0609020204030204" pitchFamily="49" charset="0"/>
+              </a:rPr>
+              <a:t>):</a:t>
             </a:r>
           </a:p>
           <a:p>

</xml_diff>